<commit_message>
Update paper by Robert
</commit_message>
<xml_diff>
--- a/docs/LeadingDim.pptx
+++ b/docs/LeadingDim.pptx
@@ -3556,7 +3556,7 @@
         <p:spPr>
           <a:xfrm>
             <a:off x="6599586" y="1422301"/>
-            <a:ext cx="1353953" cy="1709837"/>
+            <a:ext cx="1216509" cy="1709838"/>
           </a:xfrm>
           <a:prstGeom prst="rect">
             <a:avLst/>
@@ -3845,7 +3845,7 @@
         <p:spPr>
           <a:xfrm>
             <a:off x="6036602" y="1427849"/>
-            <a:ext cx="93847" cy="1552223"/>
+            <a:ext cx="93847" cy="1672343"/>
           </a:xfrm>
           <a:prstGeom prst="leftBrace">
             <a:avLst/>
@@ -4025,6 +4025,2016 @@
           </a:p>
         </p:txBody>
       </p:sp>
+      <p:grpSp>
+        <p:nvGrpSpPr>
+          <p:cNvPr id="80" name="Group 79"/>
+          <p:cNvGrpSpPr/>
+          <p:nvPr/>
+        </p:nvGrpSpPr>
+        <p:grpSpPr>
+          <a:xfrm>
+            <a:off x="1483745" y="1451592"/>
+            <a:ext cx="1129916" cy="1965253"/>
+            <a:chOff x="1483745" y="1458476"/>
+            <a:chExt cx="1129916" cy="1965253"/>
+          </a:xfrm>
+        </p:grpSpPr>
+        <p:cxnSp>
+          <p:nvCxnSpPr>
+            <p:cNvPr id="37" name="Straight Arrow Connector 36"/>
+            <p:cNvCxnSpPr/>
+            <p:nvPr/>
+          </p:nvCxnSpPr>
+          <p:spPr>
+            <a:xfrm flipH="1">
+              <a:off x="1483745" y="1458476"/>
+              <a:ext cx="4192" cy="1961295"/>
+            </a:xfrm>
+            <a:prstGeom prst="straightConnector1">
+              <a:avLst/>
+            </a:prstGeom>
+            <a:ln>
+              <a:solidFill>
+                <a:schemeClr val="tx1">
+                  <a:lumMod val="50000"/>
+                  <a:lumOff val="50000"/>
+                </a:schemeClr>
+              </a:solidFill>
+              <a:tailEnd type="triangle" w="sm" len="sm"/>
+            </a:ln>
+          </p:spPr>
+          <p:style>
+            <a:lnRef idx="1">
+              <a:schemeClr val="dk1"/>
+            </a:lnRef>
+            <a:fillRef idx="0">
+              <a:schemeClr val="dk1"/>
+            </a:fillRef>
+            <a:effectRef idx="0">
+              <a:schemeClr val="dk1"/>
+            </a:effectRef>
+            <a:fontRef idx="minor">
+              <a:schemeClr val="tx1"/>
+            </a:fontRef>
+          </p:style>
+        </p:cxnSp>
+        <p:cxnSp>
+          <p:nvCxnSpPr>
+            <p:cNvPr id="46" name="Straight Arrow Connector 45"/>
+            <p:cNvCxnSpPr/>
+            <p:nvPr/>
+          </p:nvCxnSpPr>
+          <p:spPr>
+            <a:xfrm flipH="1">
+              <a:off x="1556395" y="1459636"/>
+              <a:ext cx="4192" cy="1961295"/>
+            </a:xfrm>
+            <a:prstGeom prst="straightConnector1">
+              <a:avLst/>
+            </a:prstGeom>
+            <a:ln>
+              <a:solidFill>
+                <a:schemeClr val="tx1">
+                  <a:lumMod val="50000"/>
+                  <a:lumOff val="50000"/>
+                </a:schemeClr>
+              </a:solidFill>
+              <a:tailEnd type="triangle" w="sm" len="sm"/>
+            </a:ln>
+          </p:spPr>
+          <p:style>
+            <a:lnRef idx="1">
+              <a:schemeClr val="dk1"/>
+            </a:lnRef>
+            <a:fillRef idx="0">
+              <a:schemeClr val="dk1"/>
+            </a:fillRef>
+            <a:effectRef idx="0">
+              <a:schemeClr val="dk1"/>
+            </a:effectRef>
+            <a:fontRef idx="minor">
+              <a:schemeClr val="tx1"/>
+            </a:fontRef>
+          </p:style>
+        </p:cxnSp>
+        <p:cxnSp>
+          <p:nvCxnSpPr>
+            <p:cNvPr id="50" name="Straight Arrow Connector 49"/>
+            <p:cNvCxnSpPr/>
+            <p:nvPr/>
+          </p:nvCxnSpPr>
+          <p:spPr>
+            <a:xfrm flipH="1">
+              <a:off x="1632540" y="1458476"/>
+              <a:ext cx="4192" cy="1961295"/>
+            </a:xfrm>
+            <a:prstGeom prst="straightConnector1">
+              <a:avLst/>
+            </a:prstGeom>
+            <a:ln>
+              <a:solidFill>
+                <a:schemeClr val="tx1">
+                  <a:lumMod val="50000"/>
+                  <a:lumOff val="50000"/>
+                </a:schemeClr>
+              </a:solidFill>
+              <a:tailEnd type="triangle" w="sm" len="sm"/>
+            </a:ln>
+          </p:spPr>
+          <p:style>
+            <a:lnRef idx="1">
+              <a:schemeClr val="dk1"/>
+            </a:lnRef>
+            <a:fillRef idx="0">
+              <a:schemeClr val="dk1"/>
+            </a:fillRef>
+            <a:effectRef idx="0">
+              <a:schemeClr val="dk1"/>
+            </a:effectRef>
+            <a:fontRef idx="minor">
+              <a:schemeClr val="tx1"/>
+            </a:fontRef>
+          </p:style>
+        </p:cxnSp>
+        <p:cxnSp>
+          <p:nvCxnSpPr>
+            <p:cNvPr id="51" name="Straight Arrow Connector 50"/>
+            <p:cNvCxnSpPr/>
+            <p:nvPr/>
+          </p:nvCxnSpPr>
+          <p:spPr>
+            <a:xfrm flipH="1">
+              <a:off x="1706723" y="1459863"/>
+              <a:ext cx="4192" cy="1961295"/>
+            </a:xfrm>
+            <a:prstGeom prst="straightConnector1">
+              <a:avLst/>
+            </a:prstGeom>
+            <a:ln>
+              <a:solidFill>
+                <a:schemeClr val="tx1">
+                  <a:lumMod val="50000"/>
+                  <a:lumOff val="50000"/>
+                </a:schemeClr>
+              </a:solidFill>
+              <a:tailEnd type="triangle" w="sm" len="sm"/>
+            </a:ln>
+          </p:spPr>
+          <p:style>
+            <a:lnRef idx="1">
+              <a:schemeClr val="dk1"/>
+            </a:lnRef>
+            <a:fillRef idx="0">
+              <a:schemeClr val="dk1"/>
+            </a:fillRef>
+            <a:effectRef idx="0">
+              <a:schemeClr val="dk1"/>
+            </a:effectRef>
+            <a:fontRef idx="minor">
+              <a:schemeClr val="tx1"/>
+            </a:fontRef>
+          </p:style>
+        </p:cxnSp>
+        <p:cxnSp>
+          <p:nvCxnSpPr>
+            <p:cNvPr id="52" name="Straight Arrow Connector 51"/>
+            <p:cNvCxnSpPr/>
+            <p:nvPr/>
+          </p:nvCxnSpPr>
+          <p:spPr>
+            <a:xfrm flipH="1">
+              <a:off x="1789279" y="1459863"/>
+              <a:ext cx="4192" cy="1961295"/>
+            </a:xfrm>
+            <a:prstGeom prst="straightConnector1">
+              <a:avLst/>
+            </a:prstGeom>
+            <a:ln>
+              <a:solidFill>
+                <a:schemeClr val="tx1">
+                  <a:lumMod val="50000"/>
+                  <a:lumOff val="50000"/>
+                </a:schemeClr>
+              </a:solidFill>
+              <a:tailEnd type="triangle" w="sm" len="sm"/>
+            </a:ln>
+          </p:spPr>
+          <p:style>
+            <a:lnRef idx="1">
+              <a:schemeClr val="dk1"/>
+            </a:lnRef>
+            <a:fillRef idx="0">
+              <a:schemeClr val="dk1"/>
+            </a:fillRef>
+            <a:effectRef idx="0">
+              <a:schemeClr val="dk1"/>
+            </a:effectRef>
+            <a:fontRef idx="minor">
+              <a:schemeClr val="tx1"/>
+            </a:fontRef>
+          </p:style>
+        </p:cxnSp>
+        <p:cxnSp>
+          <p:nvCxnSpPr>
+            <p:cNvPr id="53" name="Straight Arrow Connector 52"/>
+            <p:cNvCxnSpPr/>
+            <p:nvPr/>
+          </p:nvCxnSpPr>
+          <p:spPr>
+            <a:xfrm flipH="1">
+              <a:off x="1859270" y="1459863"/>
+              <a:ext cx="4192" cy="1961295"/>
+            </a:xfrm>
+            <a:prstGeom prst="straightConnector1">
+              <a:avLst/>
+            </a:prstGeom>
+            <a:ln>
+              <a:solidFill>
+                <a:schemeClr val="tx1">
+                  <a:lumMod val="50000"/>
+                  <a:lumOff val="50000"/>
+                </a:schemeClr>
+              </a:solidFill>
+              <a:tailEnd type="triangle" w="sm" len="sm"/>
+            </a:ln>
+          </p:spPr>
+          <p:style>
+            <a:lnRef idx="1">
+              <a:schemeClr val="dk1"/>
+            </a:lnRef>
+            <a:fillRef idx="0">
+              <a:schemeClr val="dk1"/>
+            </a:fillRef>
+            <a:effectRef idx="0">
+              <a:schemeClr val="dk1"/>
+            </a:effectRef>
+            <a:fontRef idx="minor">
+              <a:schemeClr val="tx1"/>
+            </a:fontRef>
+          </p:style>
+        </p:cxnSp>
+        <p:cxnSp>
+          <p:nvCxnSpPr>
+            <p:cNvPr id="54" name="Straight Arrow Connector 53"/>
+            <p:cNvCxnSpPr/>
+            <p:nvPr/>
+          </p:nvCxnSpPr>
+          <p:spPr>
+            <a:xfrm flipH="1">
+              <a:off x="1933882" y="1459636"/>
+              <a:ext cx="4192" cy="1961295"/>
+            </a:xfrm>
+            <a:prstGeom prst="straightConnector1">
+              <a:avLst/>
+            </a:prstGeom>
+            <a:ln>
+              <a:solidFill>
+                <a:schemeClr val="tx1">
+                  <a:lumMod val="50000"/>
+                  <a:lumOff val="50000"/>
+                </a:schemeClr>
+              </a:solidFill>
+              <a:tailEnd type="triangle" w="sm" len="sm"/>
+            </a:ln>
+          </p:spPr>
+          <p:style>
+            <a:lnRef idx="1">
+              <a:schemeClr val="dk1"/>
+            </a:lnRef>
+            <a:fillRef idx="0">
+              <a:schemeClr val="dk1"/>
+            </a:fillRef>
+            <a:effectRef idx="0">
+              <a:schemeClr val="dk1"/>
+            </a:effectRef>
+            <a:fontRef idx="minor">
+              <a:schemeClr val="tx1"/>
+            </a:fontRef>
+          </p:style>
+        </p:cxnSp>
+        <p:cxnSp>
+          <p:nvCxnSpPr>
+            <p:cNvPr id="55" name="Straight Arrow Connector 54"/>
+            <p:cNvCxnSpPr/>
+            <p:nvPr/>
+          </p:nvCxnSpPr>
+          <p:spPr>
+            <a:xfrm flipH="1">
+              <a:off x="2012257" y="1458992"/>
+              <a:ext cx="4192" cy="1961295"/>
+            </a:xfrm>
+            <a:prstGeom prst="straightConnector1">
+              <a:avLst/>
+            </a:prstGeom>
+            <a:ln>
+              <a:solidFill>
+                <a:schemeClr val="tx1">
+                  <a:lumMod val="50000"/>
+                  <a:lumOff val="50000"/>
+                </a:schemeClr>
+              </a:solidFill>
+              <a:tailEnd type="triangle" w="sm" len="sm"/>
+            </a:ln>
+          </p:spPr>
+          <p:style>
+            <a:lnRef idx="1">
+              <a:schemeClr val="dk1"/>
+            </a:lnRef>
+            <a:fillRef idx="0">
+              <a:schemeClr val="dk1"/>
+            </a:fillRef>
+            <a:effectRef idx="0">
+              <a:schemeClr val="dk1"/>
+            </a:effectRef>
+            <a:fontRef idx="minor">
+              <a:schemeClr val="tx1"/>
+            </a:fontRef>
+          </p:style>
+        </p:cxnSp>
+        <p:cxnSp>
+          <p:nvCxnSpPr>
+            <p:cNvPr id="56" name="Straight Arrow Connector 55"/>
+            <p:cNvCxnSpPr/>
+            <p:nvPr/>
+          </p:nvCxnSpPr>
+          <p:spPr>
+            <a:xfrm flipH="1">
+              <a:off x="2089341" y="1460307"/>
+              <a:ext cx="4192" cy="1961295"/>
+            </a:xfrm>
+            <a:prstGeom prst="straightConnector1">
+              <a:avLst/>
+            </a:prstGeom>
+            <a:ln>
+              <a:solidFill>
+                <a:schemeClr val="tx1">
+                  <a:lumMod val="50000"/>
+                  <a:lumOff val="50000"/>
+                </a:schemeClr>
+              </a:solidFill>
+              <a:tailEnd type="triangle" w="sm" len="sm"/>
+            </a:ln>
+          </p:spPr>
+          <p:style>
+            <a:lnRef idx="1">
+              <a:schemeClr val="dk1"/>
+            </a:lnRef>
+            <a:fillRef idx="0">
+              <a:schemeClr val="dk1"/>
+            </a:fillRef>
+            <a:effectRef idx="0">
+              <a:schemeClr val="dk1"/>
+            </a:effectRef>
+            <a:fontRef idx="minor">
+              <a:schemeClr val="tx1"/>
+            </a:fontRef>
+          </p:style>
+        </p:cxnSp>
+        <p:cxnSp>
+          <p:nvCxnSpPr>
+            <p:cNvPr id="57" name="Straight Arrow Connector 56"/>
+            <p:cNvCxnSpPr/>
+            <p:nvPr/>
+          </p:nvCxnSpPr>
+          <p:spPr>
+            <a:xfrm flipH="1">
+              <a:off x="2163524" y="1461804"/>
+              <a:ext cx="4192" cy="1961295"/>
+            </a:xfrm>
+            <a:prstGeom prst="straightConnector1">
+              <a:avLst/>
+            </a:prstGeom>
+            <a:ln>
+              <a:solidFill>
+                <a:schemeClr val="tx1">
+                  <a:lumMod val="50000"/>
+                  <a:lumOff val="50000"/>
+                </a:schemeClr>
+              </a:solidFill>
+              <a:tailEnd type="triangle" w="sm" len="sm"/>
+            </a:ln>
+          </p:spPr>
+          <p:style>
+            <a:lnRef idx="1">
+              <a:schemeClr val="dk1"/>
+            </a:lnRef>
+            <a:fillRef idx="0">
+              <a:schemeClr val="dk1"/>
+            </a:fillRef>
+            <a:effectRef idx="0">
+              <a:schemeClr val="dk1"/>
+            </a:effectRef>
+            <a:fontRef idx="minor">
+              <a:schemeClr val="tx1"/>
+            </a:fontRef>
+          </p:style>
+        </p:cxnSp>
+        <p:cxnSp>
+          <p:nvCxnSpPr>
+            <p:cNvPr id="58" name="Straight Arrow Connector 57"/>
+            <p:cNvCxnSpPr/>
+            <p:nvPr/>
+          </p:nvCxnSpPr>
+          <p:spPr>
+            <a:xfrm flipH="1">
+              <a:off x="2238136" y="1462434"/>
+              <a:ext cx="4192" cy="1961295"/>
+            </a:xfrm>
+            <a:prstGeom prst="straightConnector1">
+              <a:avLst/>
+            </a:prstGeom>
+            <a:ln>
+              <a:solidFill>
+                <a:schemeClr val="tx1">
+                  <a:lumMod val="50000"/>
+                  <a:lumOff val="50000"/>
+                </a:schemeClr>
+              </a:solidFill>
+              <a:tailEnd type="triangle" w="sm" len="sm"/>
+            </a:ln>
+          </p:spPr>
+          <p:style>
+            <a:lnRef idx="1">
+              <a:schemeClr val="dk1"/>
+            </a:lnRef>
+            <a:fillRef idx="0">
+              <a:schemeClr val="dk1"/>
+            </a:fillRef>
+            <a:effectRef idx="0">
+              <a:schemeClr val="dk1"/>
+            </a:effectRef>
+            <a:fontRef idx="minor">
+              <a:schemeClr val="tx1"/>
+            </a:fontRef>
+          </p:style>
+        </p:cxnSp>
+        <p:cxnSp>
+          <p:nvCxnSpPr>
+            <p:cNvPr id="59" name="Straight Arrow Connector 58"/>
+            <p:cNvCxnSpPr/>
+            <p:nvPr/>
+          </p:nvCxnSpPr>
+          <p:spPr>
+            <a:xfrm flipH="1">
+              <a:off x="2312319" y="1459863"/>
+              <a:ext cx="4192" cy="1961295"/>
+            </a:xfrm>
+            <a:prstGeom prst="straightConnector1">
+              <a:avLst/>
+            </a:prstGeom>
+            <a:ln>
+              <a:solidFill>
+                <a:schemeClr val="tx1">
+                  <a:lumMod val="50000"/>
+                  <a:lumOff val="50000"/>
+                </a:schemeClr>
+              </a:solidFill>
+              <a:tailEnd type="triangle" w="sm" len="sm"/>
+            </a:ln>
+          </p:spPr>
+          <p:style>
+            <a:lnRef idx="1">
+              <a:schemeClr val="dk1"/>
+            </a:lnRef>
+            <a:fillRef idx="0">
+              <a:schemeClr val="dk1"/>
+            </a:fillRef>
+            <a:effectRef idx="0">
+              <a:schemeClr val="dk1"/>
+            </a:effectRef>
+            <a:fontRef idx="minor">
+              <a:schemeClr val="tx1"/>
+            </a:fontRef>
+          </p:style>
+        </p:cxnSp>
+        <p:cxnSp>
+          <p:nvCxnSpPr>
+            <p:cNvPr id="60" name="Straight Arrow Connector 59"/>
+            <p:cNvCxnSpPr/>
+            <p:nvPr/>
+          </p:nvCxnSpPr>
+          <p:spPr>
+            <a:xfrm flipH="1">
+              <a:off x="2390683" y="1461804"/>
+              <a:ext cx="4192" cy="1961295"/>
+            </a:xfrm>
+            <a:prstGeom prst="straightConnector1">
+              <a:avLst/>
+            </a:prstGeom>
+            <a:ln>
+              <a:solidFill>
+                <a:schemeClr val="tx1">
+                  <a:lumMod val="50000"/>
+                  <a:lumOff val="50000"/>
+                </a:schemeClr>
+              </a:solidFill>
+              <a:tailEnd type="triangle" w="sm" len="sm"/>
+            </a:ln>
+          </p:spPr>
+          <p:style>
+            <a:lnRef idx="1">
+              <a:schemeClr val="dk1"/>
+            </a:lnRef>
+            <a:fillRef idx="0">
+              <a:schemeClr val="dk1"/>
+            </a:fillRef>
+            <a:effectRef idx="0">
+              <a:schemeClr val="dk1"/>
+            </a:effectRef>
+            <a:fontRef idx="minor">
+              <a:schemeClr val="tx1"/>
+            </a:fontRef>
+          </p:style>
+        </p:cxnSp>
+        <p:cxnSp>
+          <p:nvCxnSpPr>
+            <p:cNvPr id="61" name="Straight Arrow Connector 60"/>
+            <p:cNvCxnSpPr/>
+            <p:nvPr/>
+          </p:nvCxnSpPr>
+          <p:spPr>
+            <a:xfrm flipH="1">
+              <a:off x="2464866" y="1461804"/>
+              <a:ext cx="4192" cy="1961295"/>
+            </a:xfrm>
+            <a:prstGeom prst="straightConnector1">
+              <a:avLst/>
+            </a:prstGeom>
+            <a:ln>
+              <a:solidFill>
+                <a:schemeClr val="tx1">
+                  <a:lumMod val="50000"/>
+                  <a:lumOff val="50000"/>
+                </a:schemeClr>
+              </a:solidFill>
+              <a:tailEnd type="triangle" w="sm" len="sm"/>
+            </a:ln>
+          </p:spPr>
+          <p:style>
+            <a:lnRef idx="1">
+              <a:schemeClr val="dk1"/>
+            </a:lnRef>
+            <a:fillRef idx="0">
+              <a:schemeClr val="dk1"/>
+            </a:fillRef>
+            <a:effectRef idx="0">
+              <a:schemeClr val="dk1"/>
+            </a:effectRef>
+            <a:fontRef idx="minor">
+              <a:schemeClr val="tx1"/>
+            </a:fontRef>
+          </p:style>
+        </p:cxnSp>
+        <p:cxnSp>
+          <p:nvCxnSpPr>
+            <p:cNvPr id="62" name="Straight Arrow Connector 61"/>
+            <p:cNvCxnSpPr/>
+            <p:nvPr/>
+          </p:nvCxnSpPr>
+          <p:spPr>
+            <a:xfrm flipH="1">
+              <a:off x="2539478" y="1461804"/>
+              <a:ext cx="4192" cy="1961295"/>
+            </a:xfrm>
+            <a:prstGeom prst="straightConnector1">
+              <a:avLst/>
+            </a:prstGeom>
+            <a:ln>
+              <a:solidFill>
+                <a:schemeClr val="tx1">
+                  <a:lumMod val="50000"/>
+                  <a:lumOff val="50000"/>
+                </a:schemeClr>
+              </a:solidFill>
+              <a:tailEnd type="triangle" w="sm" len="sm"/>
+            </a:ln>
+          </p:spPr>
+          <p:style>
+            <a:lnRef idx="1">
+              <a:schemeClr val="dk1"/>
+            </a:lnRef>
+            <a:fillRef idx="0">
+              <a:schemeClr val="dk1"/>
+            </a:fillRef>
+            <a:effectRef idx="0">
+              <a:schemeClr val="dk1"/>
+            </a:effectRef>
+            <a:fontRef idx="minor">
+              <a:schemeClr val="tx1"/>
+            </a:fontRef>
+          </p:style>
+        </p:cxnSp>
+        <p:cxnSp>
+          <p:nvCxnSpPr>
+            <p:cNvPr id="63" name="Straight Arrow Connector 62"/>
+            <p:cNvCxnSpPr/>
+            <p:nvPr/>
+          </p:nvCxnSpPr>
+          <p:spPr>
+            <a:xfrm flipH="1">
+              <a:off x="2609469" y="1459863"/>
+              <a:ext cx="4192" cy="1961295"/>
+            </a:xfrm>
+            <a:prstGeom prst="straightConnector1">
+              <a:avLst/>
+            </a:prstGeom>
+            <a:ln>
+              <a:solidFill>
+                <a:schemeClr val="tx1">
+                  <a:lumMod val="50000"/>
+                  <a:lumOff val="50000"/>
+                </a:schemeClr>
+              </a:solidFill>
+              <a:tailEnd type="triangle" w="sm" len="sm"/>
+            </a:ln>
+          </p:spPr>
+          <p:style>
+            <a:lnRef idx="1">
+              <a:schemeClr val="dk1"/>
+            </a:lnRef>
+            <a:fillRef idx="0">
+              <a:schemeClr val="dk1"/>
+            </a:fillRef>
+            <a:effectRef idx="0">
+              <a:schemeClr val="dk1"/>
+            </a:effectRef>
+            <a:fontRef idx="minor">
+              <a:schemeClr val="tx1"/>
+            </a:fontRef>
+          </p:style>
+        </p:cxnSp>
+      </p:grpSp>
+      <p:grpSp>
+        <p:nvGrpSpPr>
+          <p:cNvPr id="101" name="Group 100"/>
+          <p:cNvGrpSpPr/>
+          <p:nvPr/>
+        </p:nvGrpSpPr>
+        <p:grpSpPr>
+          <a:xfrm>
+            <a:off x="3921188" y="1457850"/>
+            <a:ext cx="1277571" cy="1513234"/>
+            <a:chOff x="3921188" y="1463783"/>
+            <a:chExt cx="1277571" cy="1965253"/>
+          </a:xfrm>
+        </p:grpSpPr>
+        <p:grpSp>
+          <p:nvGrpSpPr>
+            <p:cNvPr id="81" name="Group 80"/>
+            <p:cNvGrpSpPr/>
+            <p:nvPr/>
+          </p:nvGrpSpPr>
+          <p:grpSpPr>
+            <a:xfrm>
+              <a:off x="3921188" y="1463783"/>
+              <a:ext cx="1129916" cy="1965253"/>
+              <a:chOff x="1483745" y="1458476"/>
+              <a:chExt cx="1129916" cy="1965253"/>
+            </a:xfrm>
+          </p:grpSpPr>
+          <p:cxnSp>
+            <p:nvCxnSpPr>
+              <p:cNvPr id="82" name="Straight Arrow Connector 81"/>
+              <p:cNvCxnSpPr/>
+              <p:nvPr/>
+            </p:nvCxnSpPr>
+            <p:spPr>
+              <a:xfrm flipH="1">
+                <a:off x="1483745" y="1458476"/>
+                <a:ext cx="4192" cy="1961295"/>
+              </a:xfrm>
+              <a:prstGeom prst="straightConnector1">
+                <a:avLst/>
+              </a:prstGeom>
+              <a:ln>
+                <a:solidFill>
+                  <a:schemeClr val="tx1">
+                    <a:lumMod val="50000"/>
+                    <a:lumOff val="50000"/>
+                  </a:schemeClr>
+                </a:solidFill>
+                <a:tailEnd type="triangle" w="sm" len="sm"/>
+              </a:ln>
+            </p:spPr>
+            <p:style>
+              <a:lnRef idx="1">
+                <a:schemeClr val="dk1"/>
+              </a:lnRef>
+              <a:fillRef idx="0">
+                <a:schemeClr val="dk1"/>
+              </a:fillRef>
+              <a:effectRef idx="0">
+                <a:schemeClr val="dk1"/>
+              </a:effectRef>
+              <a:fontRef idx="minor">
+                <a:schemeClr val="tx1"/>
+              </a:fontRef>
+            </p:style>
+          </p:cxnSp>
+          <p:cxnSp>
+            <p:nvCxnSpPr>
+              <p:cNvPr id="83" name="Straight Arrow Connector 82"/>
+              <p:cNvCxnSpPr/>
+              <p:nvPr/>
+            </p:nvCxnSpPr>
+            <p:spPr>
+              <a:xfrm flipH="1">
+                <a:off x="1556395" y="1459636"/>
+                <a:ext cx="4192" cy="1961295"/>
+              </a:xfrm>
+              <a:prstGeom prst="straightConnector1">
+                <a:avLst/>
+              </a:prstGeom>
+              <a:ln>
+                <a:solidFill>
+                  <a:schemeClr val="tx1">
+                    <a:lumMod val="50000"/>
+                    <a:lumOff val="50000"/>
+                  </a:schemeClr>
+                </a:solidFill>
+                <a:tailEnd type="triangle" w="sm" len="sm"/>
+              </a:ln>
+            </p:spPr>
+            <p:style>
+              <a:lnRef idx="1">
+                <a:schemeClr val="dk1"/>
+              </a:lnRef>
+              <a:fillRef idx="0">
+                <a:schemeClr val="dk1"/>
+              </a:fillRef>
+              <a:effectRef idx="0">
+                <a:schemeClr val="dk1"/>
+              </a:effectRef>
+              <a:fontRef idx="minor">
+                <a:schemeClr val="tx1"/>
+              </a:fontRef>
+            </p:style>
+          </p:cxnSp>
+          <p:cxnSp>
+            <p:nvCxnSpPr>
+              <p:cNvPr id="84" name="Straight Arrow Connector 83"/>
+              <p:cNvCxnSpPr/>
+              <p:nvPr/>
+            </p:nvCxnSpPr>
+            <p:spPr>
+              <a:xfrm flipH="1">
+                <a:off x="1632540" y="1458476"/>
+                <a:ext cx="4192" cy="1961295"/>
+              </a:xfrm>
+              <a:prstGeom prst="straightConnector1">
+                <a:avLst/>
+              </a:prstGeom>
+              <a:ln>
+                <a:solidFill>
+                  <a:schemeClr val="tx1">
+                    <a:lumMod val="50000"/>
+                    <a:lumOff val="50000"/>
+                  </a:schemeClr>
+                </a:solidFill>
+                <a:tailEnd type="triangle" w="sm" len="sm"/>
+              </a:ln>
+            </p:spPr>
+            <p:style>
+              <a:lnRef idx="1">
+                <a:schemeClr val="dk1"/>
+              </a:lnRef>
+              <a:fillRef idx="0">
+                <a:schemeClr val="dk1"/>
+              </a:fillRef>
+              <a:effectRef idx="0">
+                <a:schemeClr val="dk1"/>
+              </a:effectRef>
+              <a:fontRef idx="minor">
+                <a:schemeClr val="tx1"/>
+              </a:fontRef>
+            </p:style>
+          </p:cxnSp>
+          <p:cxnSp>
+            <p:nvCxnSpPr>
+              <p:cNvPr id="85" name="Straight Arrow Connector 84"/>
+              <p:cNvCxnSpPr/>
+              <p:nvPr/>
+            </p:nvCxnSpPr>
+            <p:spPr>
+              <a:xfrm flipH="1">
+                <a:off x="1706723" y="1459863"/>
+                <a:ext cx="4192" cy="1961295"/>
+              </a:xfrm>
+              <a:prstGeom prst="straightConnector1">
+                <a:avLst/>
+              </a:prstGeom>
+              <a:ln>
+                <a:solidFill>
+                  <a:schemeClr val="tx1">
+                    <a:lumMod val="50000"/>
+                    <a:lumOff val="50000"/>
+                  </a:schemeClr>
+                </a:solidFill>
+                <a:tailEnd type="triangle" w="sm" len="sm"/>
+              </a:ln>
+            </p:spPr>
+            <p:style>
+              <a:lnRef idx="1">
+                <a:schemeClr val="dk1"/>
+              </a:lnRef>
+              <a:fillRef idx="0">
+                <a:schemeClr val="dk1"/>
+              </a:fillRef>
+              <a:effectRef idx="0">
+                <a:schemeClr val="dk1"/>
+              </a:effectRef>
+              <a:fontRef idx="minor">
+                <a:schemeClr val="tx1"/>
+              </a:fontRef>
+            </p:style>
+          </p:cxnSp>
+          <p:cxnSp>
+            <p:nvCxnSpPr>
+              <p:cNvPr id="86" name="Straight Arrow Connector 85"/>
+              <p:cNvCxnSpPr/>
+              <p:nvPr/>
+            </p:nvCxnSpPr>
+            <p:spPr>
+              <a:xfrm flipH="1">
+                <a:off x="1789279" y="1459863"/>
+                <a:ext cx="4192" cy="1961295"/>
+              </a:xfrm>
+              <a:prstGeom prst="straightConnector1">
+                <a:avLst/>
+              </a:prstGeom>
+              <a:ln>
+                <a:solidFill>
+                  <a:schemeClr val="tx1">
+                    <a:lumMod val="50000"/>
+                    <a:lumOff val="50000"/>
+                  </a:schemeClr>
+                </a:solidFill>
+                <a:tailEnd type="triangle" w="sm" len="sm"/>
+              </a:ln>
+            </p:spPr>
+            <p:style>
+              <a:lnRef idx="1">
+                <a:schemeClr val="dk1"/>
+              </a:lnRef>
+              <a:fillRef idx="0">
+                <a:schemeClr val="dk1"/>
+              </a:fillRef>
+              <a:effectRef idx="0">
+                <a:schemeClr val="dk1"/>
+              </a:effectRef>
+              <a:fontRef idx="minor">
+                <a:schemeClr val="tx1"/>
+              </a:fontRef>
+            </p:style>
+          </p:cxnSp>
+          <p:cxnSp>
+            <p:nvCxnSpPr>
+              <p:cNvPr id="87" name="Straight Arrow Connector 86"/>
+              <p:cNvCxnSpPr/>
+              <p:nvPr/>
+            </p:nvCxnSpPr>
+            <p:spPr>
+              <a:xfrm flipH="1">
+                <a:off x="1859270" y="1459863"/>
+                <a:ext cx="4192" cy="1961295"/>
+              </a:xfrm>
+              <a:prstGeom prst="straightConnector1">
+                <a:avLst/>
+              </a:prstGeom>
+              <a:ln>
+                <a:solidFill>
+                  <a:schemeClr val="tx1">
+                    <a:lumMod val="50000"/>
+                    <a:lumOff val="50000"/>
+                  </a:schemeClr>
+                </a:solidFill>
+                <a:tailEnd type="triangle" w="sm" len="sm"/>
+              </a:ln>
+            </p:spPr>
+            <p:style>
+              <a:lnRef idx="1">
+                <a:schemeClr val="dk1"/>
+              </a:lnRef>
+              <a:fillRef idx="0">
+                <a:schemeClr val="dk1"/>
+              </a:fillRef>
+              <a:effectRef idx="0">
+                <a:schemeClr val="dk1"/>
+              </a:effectRef>
+              <a:fontRef idx="minor">
+                <a:schemeClr val="tx1"/>
+              </a:fontRef>
+            </p:style>
+          </p:cxnSp>
+          <p:cxnSp>
+            <p:nvCxnSpPr>
+              <p:cNvPr id="88" name="Straight Arrow Connector 87"/>
+              <p:cNvCxnSpPr/>
+              <p:nvPr/>
+            </p:nvCxnSpPr>
+            <p:spPr>
+              <a:xfrm flipH="1">
+                <a:off x="1933882" y="1459636"/>
+                <a:ext cx="4192" cy="1961295"/>
+              </a:xfrm>
+              <a:prstGeom prst="straightConnector1">
+                <a:avLst/>
+              </a:prstGeom>
+              <a:ln>
+                <a:solidFill>
+                  <a:schemeClr val="tx1">
+                    <a:lumMod val="50000"/>
+                    <a:lumOff val="50000"/>
+                  </a:schemeClr>
+                </a:solidFill>
+                <a:tailEnd type="triangle" w="sm" len="sm"/>
+              </a:ln>
+            </p:spPr>
+            <p:style>
+              <a:lnRef idx="1">
+                <a:schemeClr val="dk1"/>
+              </a:lnRef>
+              <a:fillRef idx="0">
+                <a:schemeClr val="dk1"/>
+              </a:fillRef>
+              <a:effectRef idx="0">
+                <a:schemeClr val="dk1"/>
+              </a:effectRef>
+              <a:fontRef idx="minor">
+                <a:schemeClr val="tx1"/>
+              </a:fontRef>
+            </p:style>
+          </p:cxnSp>
+          <p:cxnSp>
+            <p:nvCxnSpPr>
+              <p:cNvPr id="89" name="Straight Arrow Connector 88"/>
+              <p:cNvCxnSpPr/>
+              <p:nvPr/>
+            </p:nvCxnSpPr>
+            <p:spPr>
+              <a:xfrm flipH="1">
+                <a:off x="2012257" y="1458992"/>
+                <a:ext cx="4192" cy="1961295"/>
+              </a:xfrm>
+              <a:prstGeom prst="straightConnector1">
+                <a:avLst/>
+              </a:prstGeom>
+              <a:ln>
+                <a:solidFill>
+                  <a:schemeClr val="tx1">
+                    <a:lumMod val="50000"/>
+                    <a:lumOff val="50000"/>
+                  </a:schemeClr>
+                </a:solidFill>
+                <a:tailEnd type="triangle" w="sm" len="sm"/>
+              </a:ln>
+            </p:spPr>
+            <p:style>
+              <a:lnRef idx="1">
+                <a:schemeClr val="dk1"/>
+              </a:lnRef>
+              <a:fillRef idx="0">
+                <a:schemeClr val="dk1"/>
+              </a:fillRef>
+              <a:effectRef idx="0">
+                <a:schemeClr val="dk1"/>
+              </a:effectRef>
+              <a:fontRef idx="minor">
+                <a:schemeClr val="tx1"/>
+              </a:fontRef>
+            </p:style>
+          </p:cxnSp>
+          <p:cxnSp>
+            <p:nvCxnSpPr>
+              <p:cNvPr id="90" name="Straight Arrow Connector 89"/>
+              <p:cNvCxnSpPr/>
+              <p:nvPr/>
+            </p:nvCxnSpPr>
+            <p:spPr>
+              <a:xfrm flipH="1">
+                <a:off x="2089341" y="1460307"/>
+                <a:ext cx="4192" cy="1961295"/>
+              </a:xfrm>
+              <a:prstGeom prst="straightConnector1">
+                <a:avLst/>
+              </a:prstGeom>
+              <a:ln>
+                <a:solidFill>
+                  <a:schemeClr val="tx1">
+                    <a:lumMod val="50000"/>
+                    <a:lumOff val="50000"/>
+                  </a:schemeClr>
+                </a:solidFill>
+                <a:tailEnd type="triangle" w="sm" len="sm"/>
+              </a:ln>
+            </p:spPr>
+            <p:style>
+              <a:lnRef idx="1">
+                <a:schemeClr val="dk1"/>
+              </a:lnRef>
+              <a:fillRef idx="0">
+                <a:schemeClr val="dk1"/>
+              </a:fillRef>
+              <a:effectRef idx="0">
+                <a:schemeClr val="dk1"/>
+              </a:effectRef>
+              <a:fontRef idx="minor">
+                <a:schemeClr val="tx1"/>
+              </a:fontRef>
+            </p:style>
+          </p:cxnSp>
+          <p:cxnSp>
+            <p:nvCxnSpPr>
+              <p:cNvPr id="91" name="Straight Arrow Connector 90"/>
+              <p:cNvCxnSpPr/>
+              <p:nvPr/>
+            </p:nvCxnSpPr>
+            <p:spPr>
+              <a:xfrm flipH="1">
+                <a:off x="2163524" y="1461804"/>
+                <a:ext cx="4192" cy="1961295"/>
+              </a:xfrm>
+              <a:prstGeom prst="straightConnector1">
+                <a:avLst/>
+              </a:prstGeom>
+              <a:ln>
+                <a:solidFill>
+                  <a:schemeClr val="tx1">
+                    <a:lumMod val="50000"/>
+                    <a:lumOff val="50000"/>
+                  </a:schemeClr>
+                </a:solidFill>
+                <a:tailEnd type="triangle" w="sm" len="sm"/>
+              </a:ln>
+            </p:spPr>
+            <p:style>
+              <a:lnRef idx="1">
+                <a:schemeClr val="dk1"/>
+              </a:lnRef>
+              <a:fillRef idx="0">
+                <a:schemeClr val="dk1"/>
+              </a:fillRef>
+              <a:effectRef idx="0">
+                <a:schemeClr val="dk1"/>
+              </a:effectRef>
+              <a:fontRef idx="minor">
+                <a:schemeClr val="tx1"/>
+              </a:fontRef>
+            </p:style>
+          </p:cxnSp>
+          <p:cxnSp>
+            <p:nvCxnSpPr>
+              <p:cNvPr id="92" name="Straight Arrow Connector 91"/>
+              <p:cNvCxnSpPr/>
+              <p:nvPr/>
+            </p:nvCxnSpPr>
+            <p:spPr>
+              <a:xfrm flipH="1">
+                <a:off x="2238136" y="1462434"/>
+                <a:ext cx="4192" cy="1961295"/>
+              </a:xfrm>
+              <a:prstGeom prst="straightConnector1">
+                <a:avLst/>
+              </a:prstGeom>
+              <a:ln>
+                <a:solidFill>
+                  <a:schemeClr val="tx1">
+                    <a:lumMod val="50000"/>
+                    <a:lumOff val="50000"/>
+                  </a:schemeClr>
+                </a:solidFill>
+                <a:tailEnd type="triangle" w="sm" len="sm"/>
+              </a:ln>
+            </p:spPr>
+            <p:style>
+              <a:lnRef idx="1">
+                <a:schemeClr val="dk1"/>
+              </a:lnRef>
+              <a:fillRef idx="0">
+                <a:schemeClr val="dk1"/>
+              </a:fillRef>
+              <a:effectRef idx="0">
+                <a:schemeClr val="dk1"/>
+              </a:effectRef>
+              <a:fontRef idx="minor">
+                <a:schemeClr val="tx1"/>
+              </a:fontRef>
+            </p:style>
+          </p:cxnSp>
+          <p:cxnSp>
+            <p:nvCxnSpPr>
+              <p:cNvPr id="93" name="Straight Arrow Connector 92"/>
+              <p:cNvCxnSpPr/>
+              <p:nvPr/>
+            </p:nvCxnSpPr>
+            <p:spPr>
+              <a:xfrm flipH="1">
+                <a:off x="2312319" y="1459863"/>
+                <a:ext cx="4192" cy="1961295"/>
+              </a:xfrm>
+              <a:prstGeom prst="straightConnector1">
+                <a:avLst/>
+              </a:prstGeom>
+              <a:ln>
+                <a:solidFill>
+                  <a:schemeClr val="tx1">
+                    <a:lumMod val="50000"/>
+                    <a:lumOff val="50000"/>
+                  </a:schemeClr>
+                </a:solidFill>
+                <a:tailEnd type="triangle" w="sm" len="sm"/>
+              </a:ln>
+            </p:spPr>
+            <p:style>
+              <a:lnRef idx="1">
+                <a:schemeClr val="dk1"/>
+              </a:lnRef>
+              <a:fillRef idx="0">
+                <a:schemeClr val="dk1"/>
+              </a:fillRef>
+              <a:effectRef idx="0">
+                <a:schemeClr val="dk1"/>
+              </a:effectRef>
+              <a:fontRef idx="minor">
+                <a:schemeClr val="tx1"/>
+              </a:fontRef>
+            </p:style>
+          </p:cxnSp>
+          <p:cxnSp>
+            <p:nvCxnSpPr>
+              <p:cNvPr id="94" name="Straight Arrow Connector 93"/>
+              <p:cNvCxnSpPr/>
+              <p:nvPr/>
+            </p:nvCxnSpPr>
+            <p:spPr>
+              <a:xfrm flipH="1">
+                <a:off x="2390683" y="1461804"/>
+                <a:ext cx="4192" cy="1961295"/>
+              </a:xfrm>
+              <a:prstGeom prst="straightConnector1">
+                <a:avLst/>
+              </a:prstGeom>
+              <a:ln>
+                <a:solidFill>
+                  <a:schemeClr val="tx1">
+                    <a:lumMod val="50000"/>
+                    <a:lumOff val="50000"/>
+                  </a:schemeClr>
+                </a:solidFill>
+                <a:tailEnd type="triangle" w="sm" len="sm"/>
+              </a:ln>
+            </p:spPr>
+            <p:style>
+              <a:lnRef idx="1">
+                <a:schemeClr val="dk1"/>
+              </a:lnRef>
+              <a:fillRef idx="0">
+                <a:schemeClr val="dk1"/>
+              </a:fillRef>
+              <a:effectRef idx="0">
+                <a:schemeClr val="dk1"/>
+              </a:effectRef>
+              <a:fontRef idx="minor">
+                <a:schemeClr val="tx1"/>
+              </a:fontRef>
+            </p:style>
+          </p:cxnSp>
+          <p:cxnSp>
+            <p:nvCxnSpPr>
+              <p:cNvPr id="95" name="Straight Arrow Connector 94"/>
+              <p:cNvCxnSpPr/>
+              <p:nvPr/>
+            </p:nvCxnSpPr>
+            <p:spPr>
+              <a:xfrm flipH="1">
+                <a:off x="2464866" y="1461804"/>
+                <a:ext cx="4192" cy="1961295"/>
+              </a:xfrm>
+              <a:prstGeom prst="straightConnector1">
+                <a:avLst/>
+              </a:prstGeom>
+              <a:ln>
+                <a:solidFill>
+                  <a:schemeClr val="tx1">
+                    <a:lumMod val="50000"/>
+                    <a:lumOff val="50000"/>
+                  </a:schemeClr>
+                </a:solidFill>
+                <a:tailEnd type="triangle" w="sm" len="sm"/>
+              </a:ln>
+            </p:spPr>
+            <p:style>
+              <a:lnRef idx="1">
+                <a:schemeClr val="dk1"/>
+              </a:lnRef>
+              <a:fillRef idx="0">
+                <a:schemeClr val="dk1"/>
+              </a:fillRef>
+              <a:effectRef idx="0">
+                <a:schemeClr val="dk1"/>
+              </a:effectRef>
+              <a:fontRef idx="minor">
+                <a:schemeClr val="tx1"/>
+              </a:fontRef>
+            </p:style>
+          </p:cxnSp>
+          <p:cxnSp>
+            <p:nvCxnSpPr>
+              <p:cNvPr id="96" name="Straight Arrow Connector 95"/>
+              <p:cNvCxnSpPr/>
+              <p:nvPr/>
+            </p:nvCxnSpPr>
+            <p:spPr>
+              <a:xfrm flipH="1">
+                <a:off x="2539478" y="1461804"/>
+                <a:ext cx="4192" cy="1961295"/>
+              </a:xfrm>
+              <a:prstGeom prst="straightConnector1">
+                <a:avLst/>
+              </a:prstGeom>
+              <a:ln>
+                <a:solidFill>
+                  <a:schemeClr val="tx1">
+                    <a:lumMod val="50000"/>
+                    <a:lumOff val="50000"/>
+                  </a:schemeClr>
+                </a:solidFill>
+                <a:tailEnd type="triangle" w="sm" len="sm"/>
+              </a:ln>
+            </p:spPr>
+            <p:style>
+              <a:lnRef idx="1">
+                <a:schemeClr val="dk1"/>
+              </a:lnRef>
+              <a:fillRef idx="0">
+                <a:schemeClr val="dk1"/>
+              </a:fillRef>
+              <a:effectRef idx="0">
+                <a:schemeClr val="dk1"/>
+              </a:effectRef>
+              <a:fontRef idx="minor">
+                <a:schemeClr val="tx1"/>
+              </a:fontRef>
+            </p:style>
+          </p:cxnSp>
+          <p:cxnSp>
+            <p:nvCxnSpPr>
+              <p:cNvPr id="97" name="Straight Arrow Connector 96"/>
+              <p:cNvCxnSpPr/>
+              <p:nvPr/>
+            </p:nvCxnSpPr>
+            <p:spPr>
+              <a:xfrm flipH="1">
+                <a:off x="2609469" y="1459863"/>
+                <a:ext cx="4192" cy="1961295"/>
+              </a:xfrm>
+              <a:prstGeom prst="straightConnector1">
+                <a:avLst/>
+              </a:prstGeom>
+              <a:ln>
+                <a:solidFill>
+                  <a:schemeClr val="tx1">
+                    <a:lumMod val="50000"/>
+                    <a:lumOff val="50000"/>
+                  </a:schemeClr>
+                </a:solidFill>
+                <a:tailEnd type="triangle" w="sm" len="sm"/>
+              </a:ln>
+            </p:spPr>
+            <p:style>
+              <a:lnRef idx="1">
+                <a:schemeClr val="dk1"/>
+              </a:lnRef>
+              <a:fillRef idx="0">
+                <a:schemeClr val="dk1"/>
+              </a:fillRef>
+              <a:effectRef idx="0">
+                <a:schemeClr val="dk1"/>
+              </a:effectRef>
+              <a:fontRef idx="minor">
+                <a:schemeClr val="tx1"/>
+              </a:fontRef>
+            </p:style>
+          </p:cxnSp>
+        </p:grpSp>
+        <p:cxnSp>
+          <p:nvCxnSpPr>
+            <p:cNvPr id="98" name="Straight Arrow Connector 97"/>
+            <p:cNvCxnSpPr/>
+            <p:nvPr/>
+          </p:nvCxnSpPr>
+          <p:spPr>
+            <a:xfrm flipH="1">
+              <a:off x="5119955" y="1466240"/>
+              <a:ext cx="4192" cy="1961295"/>
+            </a:xfrm>
+            <a:prstGeom prst="straightConnector1">
+              <a:avLst/>
+            </a:prstGeom>
+            <a:ln>
+              <a:solidFill>
+                <a:schemeClr val="tx1">
+                  <a:lumMod val="50000"/>
+                  <a:lumOff val="50000"/>
+                </a:schemeClr>
+              </a:solidFill>
+              <a:tailEnd type="triangle" w="sm" len="sm"/>
+            </a:ln>
+          </p:spPr>
+          <p:style>
+            <a:lnRef idx="1">
+              <a:schemeClr val="dk1"/>
+            </a:lnRef>
+            <a:fillRef idx="0">
+              <a:schemeClr val="dk1"/>
+            </a:fillRef>
+            <a:effectRef idx="0">
+              <a:schemeClr val="dk1"/>
+            </a:effectRef>
+            <a:fontRef idx="minor">
+              <a:schemeClr val="tx1"/>
+            </a:fontRef>
+          </p:style>
+        </p:cxnSp>
+        <p:cxnSp>
+          <p:nvCxnSpPr>
+            <p:cNvPr id="99" name="Straight Arrow Connector 98"/>
+            <p:cNvCxnSpPr/>
+            <p:nvPr/>
+          </p:nvCxnSpPr>
+          <p:spPr>
+            <a:xfrm flipH="1">
+              <a:off x="5194567" y="1466240"/>
+              <a:ext cx="4192" cy="1961295"/>
+            </a:xfrm>
+            <a:prstGeom prst="straightConnector1">
+              <a:avLst/>
+            </a:prstGeom>
+            <a:ln>
+              <a:solidFill>
+                <a:schemeClr val="tx1">
+                  <a:lumMod val="50000"/>
+                  <a:lumOff val="50000"/>
+                </a:schemeClr>
+              </a:solidFill>
+              <a:tailEnd type="triangle" w="sm" len="sm"/>
+            </a:ln>
+          </p:spPr>
+          <p:style>
+            <a:lnRef idx="1">
+              <a:schemeClr val="dk1"/>
+            </a:lnRef>
+            <a:fillRef idx="0">
+              <a:schemeClr val="dk1"/>
+            </a:fillRef>
+            <a:effectRef idx="0">
+              <a:schemeClr val="dk1"/>
+            </a:effectRef>
+            <a:fontRef idx="minor">
+              <a:schemeClr val="tx1"/>
+            </a:fontRef>
+          </p:style>
+        </p:cxnSp>
+      </p:grpSp>
+      <p:grpSp>
+        <p:nvGrpSpPr>
+          <p:cNvPr id="102" name="Group 101"/>
+          <p:cNvGrpSpPr/>
+          <p:nvPr/>
+        </p:nvGrpSpPr>
+        <p:grpSpPr>
+          <a:xfrm>
+            <a:off x="6641174" y="1460905"/>
+            <a:ext cx="1129916" cy="1671234"/>
+            <a:chOff x="1483745" y="1458476"/>
+            <a:chExt cx="1129916" cy="1965253"/>
+          </a:xfrm>
+        </p:grpSpPr>
+        <p:cxnSp>
+          <p:nvCxnSpPr>
+            <p:cNvPr id="103" name="Straight Arrow Connector 102"/>
+            <p:cNvCxnSpPr/>
+            <p:nvPr/>
+          </p:nvCxnSpPr>
+          <p:spPr>
+            <a:xfrm flipH="1">
+              <a:off x="1483745" y="1458476"/>
+              <a:ext cx="4192" cy="1961295"/>
+            </a:xfrm>
+            <a:prstGeom prst="straightConnector1">
+              <a:avLst/>
+            </a:prstGeom>
+            <a:ln>
+              <a:solidFill>
+                <a:schemeClr val="tx1">
+                  <a:lumMod val="50000"/>
+                  <a:lumOff val="50000"/>
+                </a:schemeClr>
+              </a:solidFill>
+              <a:tailEnd type="triangle" w="sm" len="sm"/>
+            </a:ln>
+          </p:spPr>
+          <p:style>
+            <a:lnRef idx="1">
+              <a:schemeClr val="dk1"/>
+            </a:lnRef>
+            <a:fillRef idx="0">
+              <a:schemeClr val="dk1"/>
+            </a:fillRef>
+            <a:effectRef idx="0">
+              <a:schemeClr val="dk1"/>
+            </a:effectRef>
+            <a:fontRef idx="minor">
+              <a:schemeClr val="tx1"/>
+            </a:fontRef>
+          </p:style>
+        </p:cxnSp>
+        <p:cxnSp>
+          <p:nvCxnSpPr>
+            <p:cNvPr id="104" name="Straight Arrow Connector 103"/>
+            <p:cNvCxnSpPr/>
+            <p:nvPr/>
+          </p:nvCxnSpPr>
+          <p:spPr>
+            <a:xfrm flipH="1">
+              <a:off x="1556395" y="1459636"/>
+              <a:ext cx="4192" cy="1961295"/>
+            </a:xfrm>
+            <a:prstGeom prst="straightConnector1">
+              <a:avLst/>
+            </a:prstGeom>
+            <a:ln>
+              <a:solidFill>
+                <a:schemeClr val="tx1">
+                  <a:lumMod val="50000"/>
+                  <a:lumOff val="50000"/>
+                </a:schemeClr>
+              </a:solidFill>
+              <a:tailEnd type="triangle" w="sm" len="sm"/>
+            </a:ln>
+          </p:spPr>
+          <p:style>
+            <a:lnRef idx="1">
+              <a:schemeClr val="dk1"/>
+            </a:lnRef>
+            <a:fillRef idx="0">
+              <a:schemeClr val="dk1"/>
+            </a:fillRef>
+            <a:effectRef idx="0">
+              <a:schemeClr val="dk1"/>
+            </a:effectRef>
+            <a:fontRef idx="minor">
+              <a:schemeClr val="tx1"/>
+            </a:fontRef>
+          </p:style>
+        </p:cxnSp>
+        <p:cxnSp>
+          <p:nvCxnSpPr>
+            <p:cNvPr id="105" name="Straight Arrow Connector 104"/>
+            <p:cNvCxnSpPr/>
+            <p:nvPr/>
+          </p:nvCxnSpPr>
+          <p:spPr>
+            <a:xfrm flipH="1">
+              <a:off x="1632540" y="1458476"/>
+              <a:ext cx="4192" cy="1961295"/>
+            </a:xfrm>
+            <a:prstGeom prst="straightConnector1">
+              <a:avLst/>
+            </a:prstGeom>
+            <a:ln>
+              <a:solidFill>
+                <a:schemeClr val="tx1">
+                  <a:lumMod val="50000"/>
+                  <a:lumOff val="50000"/>
+                </a:schemeClr>
+              </a:solidFill>
+              <a:tailEnd type="triangle" w="sm" len="sm"/>
+            </a:ln>
+          </p:spPr>
+          <p:style>
+            <a:lnRef idx="1">
+              <a:schemeClr val="dk1"/>
+            </a:lnRef>
+            <a:fillRef idx="0">
+              <a:schemeClr val="dk1"/>
+            </a:fillRef>
+            <a:effectRef idx="0">
+              <a:schemeClr val="dk1"/>
+            </a:effectRef>
+            <a:fontRef idx="minor">
+              <a:schemeClr val="tx1"/>
+            </a:fontRef>
+          </p:style>
+        </p:cxnSp>
+        <p:cxnSp>
+          <p:nvCxnSpPr>
+            <p:cNvPr id="106" name="Straight Arrow Connector 105"/>
+            <p:cNvCxnSpPr/>
+            <p:nvPr/>
+          </p:nvCxnSpPr>
+          <p:spPr>
+            <a:xfrm flipH="1">
+              <a:off x="1706723" y="1459863"/>
+              <a:ext cx="4192" cy="1961295"/>
+            </a:xfrm>
+            <a:prstGeom prst="straightConnector1">
+              <a:avLst/>
+            </a:prstGeom>
+            <a:ln>
+              <a:solidFill>
+                <a:schemeClr val="tx1">
+                  <a:lumMod val="50000"/>
+                  <a:lumOff val="50000"/>
+                </a:schemeClr>
+              </a:solidFill>
+              <a:tailEnd type="triangle" w="sm" len="sm"/>
+            </a:ln>
+          </p:spPr>
+          <p:style>
+            <a:lnRef idx="1">
+              <a:schemeClr val="dk1"/>
+            </a:lnRef>
+            <a:fillRef idx="0">
+              <a:schemeClr val="dk1"/>
+            </a:fillRef>
+            <a:effectRef idx="0">
+              <a:schemeClr val="dk1"/>
+            </a:effectRef>
+            <a:fontRef idx="minor">
+              <a:schemeClr val="tx1"/>
+            </a:fontRef>
+          </p:style>
+        </p:cxnSp>
+        <p:cxnSp>
+          <p:nvCxnSpPr>
+            <p:cNvPr id="107" name="Straight Arrow Connector 106"/>
+            <p:cNvCxnSpPr/>
+            <p:nvPr/>
+          </p:nvCxnSpPr>
+          <p:spPr>
+            <a:xfrm flipH="1">
+              <a:off x="1789279" y="1459863"/>
+              <a:ext cx="4192" cy="1961295"/>
+            </a:xfrm>
+            <a:prstGeom prst="straightConnector1">
+              <a:avLst/>
+            </a:prstGeom>
+            <a:ln>
+              <a:solidFill>
+                <a:schemeClr val="tx1">
+                  <a:lumMod val="50000"/>
+                  <a:lumOff val="50000"/>
+                </a:schemeClr>
+              </a:solidFill>
+              <a:tailEnd type="triangle" w="sm" len="sm"/>
+            </a:ln>
+          </p:spPr>
+          <p:style>
+            <a:lnRef idx="1">
+              <a:schemeClr val="dk1"/>
+            </a:lnRef>
+            <a:fillRef idx="0">
+              <a:schemeClr val="dk1"/>
+            </a:fillRef>
+            <a:effectRef idx="0">
+              <a:schemeClr val="dk1"/>
+            </a:effectRef>
+            <a:fontRef idx="minor">
+              <a:schemeClr val="tx1"/>
+            </a:fontRef>
+          </p:style>
+        </p:cxnSp>
+        <p:cxnSp>
+          <p:nvCxnSpPr>
+            <p:cNvPr id="108" name="Straight Arrow Connector 107"/>
+            <p:cNvCxnSpPr/>
+            <p:nvPr/>
+          </p:nvCxnSpPr>
+          <p:spPr>
+            <a:xfrm flipH="1">
+              <a:off x="1859270" y="1459863"/>
+              <a:ext cx="4192" cy="1961295"/>
+            </a:xfrm>
+            <a:prstGeom prst="straightConnector1">
+              <a:avLst/>
+            </a:prstGeom>
+            <a:ln>
+              <a:solidFill>
+                <a:schemeClr val="tx1">
+                  <a:lumMod val="50000"/>
+                  <a:lumOff val="50000"/>
+                </a:schemeClr>
+              </a:solidFill>
+              <a:tailEnd type="triangle" w="sm" len="sm"/>
+            </a:ln>
+          </p:spPr>
+          <p:style>
+            <a:lnRef idx="1">
+              <a:schemeClr val="dk1"/>
+            </a:lnRef>
+            <a:fillRef idx="0">
+              <a:schemeClr val="dk1"/>
+            </a:fillRef>
+            <a:effectRef idx="0">
+              <a:schemeClr val="dk1"/>
+            </a:effectRef>
+            <a:fontRef idx="minor">
+              <a:schemeClr val="tx1"/>
+            </a:fontRef>
+          </p:style>
+        </p:cxnSp>
+        <p:cxnSp>
+          <p:nvCxnSpPr>
+            <p:cNvPr id="109" name="Straight Arrow Connector 108"/>
+            <p:cNvCxnSpPr/>
+            <p:nvPr/>
+          </p:nvCxnSpPr>
+          <p:spPr>
+            <a:xfrm flipH="1">
+              <a:off x="1933882" y="1459636"/>
+              <a:ext cx="4192" cy="1961295"/>
+            </a:xfrm>
+            <a:prstGeom prst="straightConnector1">
+              <a:avLst/>
+            </a:prstGeom>
+            <a:ln>
+              <a:solidFill>
+                <a:schemeClr val="tx1">
+                  <a:lumMod val="50000"/>
+                  <a:lumOff val="50000"/>
+                </a:schemeClr>
+              </a:solidFill>
+              <a:tailEnd type="triangle" w="sm" len="sm"/>
+            </a:ln>
+          </p:spPr>
+          <p:style>
+            <a:lnRef idx="1">
+              <a:schemeClr val="dk1"/>
+            </a:lnRef>
+            <a:fillRef idx="0">
+              <a:schemeClr val="dk1"/>
+            </a:fillRef>
+            <a:effectRef idx="0">
+              <a:schemeClr val="dk1"/>
+            </a:effectRef>
+            <a:fontRef idx="minor">
+              <a:schemeClr val="tx1"/>
+            </a:fontRef>
+          </p:style>
+        </p:cxnSp>
+        <p:cxnSp>
+          <p:nvCxnSpPr>
+            <p:cNvPr id="110" name="Straight Arrow Connector 109"/>
+            <p:cNvCxnSpPr/>
+            <p:nvPr/>
+          </p:nvCxnSpPr>
+          <p:spPr>
+            <a:xfrm flipH="1">
+              <a:off x="2012257" y="1458992"/>
+              <a:ext cx="4192" cy="1961295"/>
+            </a:xfrm>
+            <a:prstGeom prst="straightConnector1">
+              <a:avLst/>
+            </a:prstGeom>
+            <a:ln>
+              <a:solidFill>
+                <a:schemeClr val="tx1">
+                  <a:lumMod val="50000"/>
+                  <a:lumOff val="50000"/>
+                </a:schemeClr>
+              </a:solidFill>
+              <a:tailEnd type="triangle" w="sm" len="sm"/>
+            </a:ln>
+          </p:spPr>
+          <p:style>
+            <a:lnRef idx="1">
+              <a:schemeClr val="dk1"/>
+            </a:lnRef>
+            <a:fillRef idx="0">
+              <a:schemeClr val="dk1"/>
+            </a:fillRef>
+            <a:effectRef idx="0">
+              <a:schemeClr val="dk1"/>
+            </a:effectRef>
+            <a:fontRef idx="minor">
+              <a:schemeClr val="tx1"/>
+            </a:fontRef>
+          </p:style>
+        </p:cxnSp>
+        <p:cxnSp>
+          <p:nvCxnSpPr>
+            <p:cNvPr id="111" name="Straight Arrow Connector 110"/>
+            <p:cNvCxnSpPr/>
+            <p:nvPr/>
+          </p:nvCxnSpPr>
+          <p:spPr>
+            <a:xfrm flipH="1">
+              <a:off x="2089341" y="1460307"/>
+              <a:ext cx="4192" cy="1961295"/>
+            </a:xfrm>
+            <a:prstGeom prst="straightConnector1">
+              <a:avLst/>
+            </a:prstGeom>
+            <a:ln>
+              <a:solidFill>
+                <a:schemeClr val="tx1">
+                  <a:lumMod val="50000"/>
+                  <a:lumOff val="50000"/>
+                </a:schemeClr>
+              </a:solidFill>
+              <a:tailEnd type="triangle" w="sm" len="sm"/>
+            </a:ln>
+          </p:spPr>
+          <p:style>
+            <a:lnRef idx="1">
+              <a:schemeClr val="dk1"/>
+            </a:lnRef>
+            <a:fillRef idx="0">
+              <a:schemeClr val="dk1"/>
+            </a:fillRef>
+            <a:effectRef idx="0">
+              <a:schemeClr val="dk1"/>
+            </a:effectRef>
+            <a:fontRef idx="minor">
+              <a:schemeClr val="tx1"/>
+            </a:fontRef>
+          </p:style>
+        </p:cxnSp>
+        <p:cxnSp>
+          <p:nvCxnSpPr>
+            <p:cNvPr id="112" name="Straight Arrow Connector 111"/>
+            <p:cNvCxnSpPr/>
+            <p:nvPr/>
+          </p:nvCxnSpPr>
+          <p:spPr>
+            <a:xfrm flipH="1">
+              <a:off x="2163524" y="1461804"/>
+              <a:ext cx="4192" cy="1961295"/>
+            </a:xfrm>
+            <a:prstGeom prst="straightConnector1">
+              <a:avLst/>
+            </a:prstGeom>
+            <a:ln>
+              <a:solidFill>
+                <a:schemeClr val="tx1">
+                  <a:lumMod val="50000"/>
+                  <a:lumOff val="50000"/>
+                </a:schemeClr>
+              </a:solidFill>
+              <a:tailEnd type="triangle" w="sm" len="sm"/>
+            </a:ln>
+          </p:spPr>
+          <p:style>
+            <a:lnRef idx="1">
+              <a:schemeClr val="dk1"/>
+            </a:lnRef>
+            <a:fillRef idx="0">
+              <a:schemeClr val="dk1"/>
+            </a:fillRef>
+            <a:effectRef idx="0">
+              <a:schemeClr val="dk1"/>
+            </a:effectRef>
+            <a:fontRef idx="minor">
+              <a:schemeClr val="tx1"/>
+            </a:fontRef>
+          </p:style>
+        </p:cxnSp>
+        <p:cxnSp>
+          <p:nvCxnSpPr>
+            <p:cNvPr id="113" name="Straight Arrow Connector 112"/>
+            <p:cNvCxnSpPr/>
+            <p:nvPr/>
+          </p:nvCxnSpPr>
+          <p:spPr>
+            <a:xfrm flipH="1">
+              <a:off x="2238136" y="1462434"/>
+              <a:ext cx="4192" cy="1961295"/>
+            </a:xfrm>
+            <a:prstGeom prst="straightConnector1">
+              <a:avLst/>
+            </a:prstGeom>
+            <a:ln>
+              <a:solidFill>
+                <a:schemeClr val="tx1">
+                  <a:lumMod val="50000"/>
+                  <a:lumOff val="50000"/>
+                </a:schemeClr>
+              </a:solidFill>
+              <a:tailEnd type="triangle" w="sm" len="sm"/>
+            </a:ln>
+          </p:spPr>
+          <p:style>
+            <a:lnRef idx="1">
+              <a:schemeClr val="dk1"/>
+            </a:lnRef>
+            <a:fillRef idx="0">
+              <a:schemeClr val="dk1"/>
+            </a:fillRef>
+            <a:effectRef idx="0">
+              <a:schemeClr val="dk1"/>
+            </a:effectRef>
+            <a:fontRef idx="minor">
+              <a:schemeClr val="tx1"/>
+            </a:fontRef>
+          </p:style>
+        </p:cxnSp>
+        <p:cxnSp>
+          <p:nvCxnSpPr>
+            <p:cNvPr id="114" name="Straight Arrow Connector 113"/>
+            <p:cNvCxnSpPr/>
+            <p:nvPr/>
+          </p:nvCxnSpPr>
+          <p:spPr>
+            <a:xfrm flipH="1">
+              <a:off x="2312319" y="1459863"/>
+              <a:ext cx="4192" cy="1961295"/>
+            </a:xfrm>
+            <a:prstGeom prst="straightConnector1">
+              <a:avLst/>
+            </a:prstGeom>
+            <a:ln>
+              <a:solidFill>
+                <a:schemeClr val="tx1">
+                  <a:lumMod val="50000"/>
+                  <a:lumOff val="50000"/>
+                </a:schemeClr>
+              </a:solidFill>
+              <a:tailEnd type="triangle" w="sm" len="sm"/>
+            </a:ln>
+          </p:spPr>
+          <p:style>
+            <a:lnRef idx="1">
+              <a:schemeClr val="dk1"/>
+            </a:lnRef>
+            <a:fillRef idx="0">
+              <a:schemeClr val="dk1"/>
+            </a:fillRef>
+            <a:effectRef idx="0">
+              <a:schemeClr val="dk1"/>
+            </a:effectRef>
+            <a:fontRef idx="minor">
+              <a:schemeClr val="tx1"/>
+            </a:fontRef>
+          </p:style>
+        </p:cxnSp>
+        <p:cxnSp>
+          <p:nvCxnSpPr>
+            <p:cNvPr id="115" name="Straight Arrow Connector 114"/>
+            <p:cNvCxnSpPr/>
+            <p:nvPr/>
+          </p:nvCxnSpPr>
+          <p:spPr>
+            <a:xfrm flipH="1">
+              <a:off x="2390683" y="1461804"/>
+              <a:ext cx="4192" cy="1961295"/>
+            </a:xfrm>
+            <a:prstGeom prst="straightConnector1">
+              <a:avLst/>
+            </a:prstGeom>
+            <a:ln>
+              <a:solidFill>
+                <a:schemeClr val="tx1">
+                  <a:lumMod val="50000"/>
+                  <a:lumOff val="50000"/>
+                </a:schemeClr>
+              </a:solidFill>
+              <a:tailEnd type="triangle" w="sm" len="sm"/>
+            </a:ln>
+          </p:spPr>
+          <p:style>
+            <a:lnRef idx="1">
+              <a:schemeClr val="dk1"/>
+            </a:lnRef>
+            <a:fillRef idx="0">
+              <a:schemeClr val="dk1"/>
+            </a:fillRef>
+            <a:effectRef idx="0">
+              <a:schemeClr val="dk1"/>
+            </a:effectRef>
+            <a:fontRef idx="minor">
+              <a:schemeClr val="tx1"/>
+            </a:fontRef>
+          </p:style>
+        </p:cxnSp>
+        <p:cxnSp>
+          <p:nvCxnSpPr>
+            <p:cNvPr id="116" name="Straight Arrow Connector 115"/>
+            <p:cNvCxnSpPr/>
+            <p:nvPr/>
+          </p:nvCxnSpPr>
+          <p:spPr>
+            <a:xfrm flipH="1">
+              <a:off x="2464866" y="1461804"/>
+              <a:ext cx="4192" cy="1961295"/>
+            </a:xfrm>
+            <a:prstGeom prst="straightConnector1">
+              <a:avLst/>
+            </a:prstGeom>
+            <a:ln>
+              <a:solidFill>
+                <a:schemeClr val="tx1">
+                  <a:lumMod val="50000"/>
+                  <a:lumOff val="50000"/>
+                </a:schemeClr>
+              </a:solidFill>
+              <a:tailEnd type="triangle" w="sm" len="sm"/>
+            </a:ln>
+          </p:spPr>
+          <p:style>
+            <a:lnRef idx="1">
+              <a:schemeClr val="dk1"/>
+            </a:lnRef>
+            <a:fillRef idx="0">
+              <a:schemeClr val="dk1"/>
+            </a:fillRef>
+            <a:effectRef idx="0">
+              <a:schemeClr val="dk1"/>
+            </a:effectRef>
+            <a:fontRef idx="minor">
+              <a:schemeClr val="tx1"/>
+            </a:fontRef>
+          </p:style>
+        </p:cxnSp>
+        <p:cxnSp>
+          <p:nvCxnSpPr>
+            <p:cNvPr id="117" name="Straight Arrow Connector 116"/>
+            <p:cNvCxnSpPr/>
+            <p:nvPr/>
+          </p:nvCxnSpPr>
+          <p:spPr>
+            <a:xfrm flipH="1">
+              <a:off x="2539478" y="1461804"/>
+              <a:ext cx="4192" cy="1961295"/>
+            </a:xfrm>
+            <a:prstGeom prst="straightConnector1">
+              <a:avLst/>
+            </a:prstGeom>
+            <a:ln>
+              <a:solidFill>
+                <a:schemeClr val="tx1">
+                  <a:lumMod val="50000"/>
+                  <a:lumOff val="50000"/>
+                </a:schemeClr>
+              </a:solidFill>
+              <a:tailEnd type="triangle" w="sm" len="sm"/>
+            </a:ln>
+          </p:spPr>
+          <p:style>
+            <a:lnRef idx="1">
+              <a:schemeClr val="dk1"/>
+            </a:lnRef>
+            <a:fillRef idx="0">
+              <a:schemeClr val="dk1"/>
+            </a:fillRef>
+            <a:effectRef idx="0">
+              <a:schemeClr val="dk1"/>
+            </a:effectRef>
+            <a:fontRef idx="minor">
+              <a:schemeClr val="tx1"/>
+            </a:fontRef>
+          </p:style>
+        </p:cxnSp>
+        <p:cxnSp>
+          <p:nvCxnSpPr>
+            <p:cNvPr id="118" name="Straight Arrow Connector 117"/>
+            <p:cNvCxnSpPr/>
+            <p:nvPr/>
+          </p:nvCxnSpPr>
+          <p:spPr>
+            <a:xfrm flipH="1">
+              <a:off x="2609469" y="1459863"/>
+              <a:ext cx="4192" cy="1961295"/>
+            </a:xfrm>
+            <a:prstGeom prst="straightConnector1">
+              <a:avLst/>
+            </a:prstGeom>
+            <a:ln>
+              <a:solidFill>
+                <a:schemeClr val="tx1">
+                  <a:lumMod val="50000"/>
+                  <a:lumOff val="50000"/>
+                </a:schemeClr>
+              </a:solidFill>
+              <a:tailEnd type="triangle" w="sm" len="sm"/>
+            </a:ln>
+          </p:spPr>
+          <p:style>
+            <a:lnRef idx="1">
+              <a:schemeClr val="dk1"/>
+            </a:lnRef>
+            <a:fillRef idx="0">
+              <a:schemeClr val="dk1"/>
+            </a:fillRef>
+            <a:effectRef idx="0">
+              <a:schemeClr val="dk1"/>
+            </a:effectRef>
+            <a:fontRef idx="minor">
+              <a:schemeClr val="tx1"/>
+            </a:fontRef>
+          </p:style>
+        </p:cxnSp>
+      </p:grpSp>
     </p:spTree>
     <p:extLst>
       <p:ext uri="{BB962C8B-B14F-4D97-AF65-F5344CB8AC3E}">
@@ -4035,6 +6045,13 @@
   <p:clrMapOvr>
     <a:masterClrMapping/>
   </p:clrMapOvr>
+  <p:timing>
+    <p:tnLst>
+      <p:par>
+        <p:cTn xmlns:p14="http://schemas.microsoft.com/office/powerpoint/2010/main" id="1" dur="indefinite" restart="never" nodeType="tmRoot"/>
+      </p:par>
+    </p:tnLst>
+  </p:timing>
 </p:sld>
 </file>
 

</xml_diff>